<commit_message>
Ajustando a geraçao do relatorio
</commit_message>
<xml_diff>
--- a/AiderHubAtual/Relatorio/certificado_de_conclusão_modelo.pptx
+++ b/AiderHubAtual/Relatorio/certificado_de_conclusão_modelo.pptx
@@ -11356,9 +11356,21 @@
                 <a:cs typeface="Caveat"/>
                 <a:sym typeface="Caveat"/>
               </a:rPr>
-              <a:t>nome_voluntario</a:t>
+              <a:t>nome_</a:t>
             </a:r>
-            <a:endParaRPr sz="1800" b="0" i="0" u="none" strike="noStrike" cap="none" dirty="0">
+            <a:r>
+              <a:rPr lang="en-US" sz="4537" b="0" i="0" u="sng" strike="noStrike" cap="none" dirty="0" err="1">
+                <a:solidFill>
+                  <a:srgbClr val="FB7D2B"/>
+                </a:solidFill>
+                <a:latin typeface="Caveat"/>
+                <a:ea typeface="Caveat"/>
+                <a:cs typeface="Caveat"/>
+                <a:sym typeface="Caveat"/>
+              </a:rPr>
+              <a:t>voluntario</a:t>
+            </a:r>
+            <a:endParaRPr sz="1800" b="0" i="0" u="sng" strike="noStrike" cap="none" dirty="0">
               <a:solidFill>
                 <a:schemeClr val="dk1"/>
               </a:solidFill>
@@ -11422,7 +11434,7 @@
                 <a:cs typeface="Bebas Neue"/>
                 <a:sym typeface="Bebas Neue"/>
               </a:rPr>
-              <a:t>PARTICIPOU DE UMA AÇÃO SOCIAL DA ONG  &lt;&lt;NOME_ONG&gt;&gt;, COM A CARGA HORÁRIA DE CARGA_HORARIA.</a:t>
+              <a:t>PARTICIPOU DE UMA AÇÃO SOCIAL DA ONG  NOME_ONG, COM A CARGA HORÁRIA DE CARGA_HORARIA Horas.</a:t>
             </a:r>
             <a:endParaRPr sz="1800" b="0" i="0" u="none" strike="noStrike" cap="none" dirty="0">
               <a:solidFill>

</xml_diff>